<commit_message>
Added pdf images. Poster slides update
</commit_message>
<xml_diff>
--- a/Administration Documents/Poster Template/Feathergraphics/PowerPoint Diagrams/OpenTSDB.pptx
+++ b/Administration Documents/Poster Template/Feathergraphics/PowerPoint Diagrams/OpenTSDB.pptx
@@ -104,6 +104,11 @@
       </a:defRPr>
     </a:lvl9pPr>
   </p:defaultTextStyle>
+  <p:extLst>
+    <p:ext uri="{EFAFB233-063F-42B5-8137-9DF3F51BA10A}">
+      <p15:sldGuideLst xmlns:p15="http://schemas.microsoft.com/office/powerpoint/2012/main"/>
+    </p:ext>
+  </p:extLst>
 </p:presentation>
 </file>
 
@@ -3326,8 +3331,18 @@
 </file>
 
 <file path=ppt/slides/slide1.xml><?xml version="1.0" encoding="utf-8"?>
-<p:sld xmlns:a="http://schemas.openxmlformats.org/drawingml/2006/main" xmlns:r="http://schemas.openxmlformats.org/officeDocument/2006/relationships" xmlns:p="http://schemas.openxmlformats.org/presentationml/2006/main">
+<p:sld xmlns:a="http://schemas.openxmlformats.org/drawingml/2006/main" xmlns:r="http://schemas.openxmlformats.org/officeDocument/2006/relationships" xmlns:p="http://schemas.openxmlformats.org/presentationml/2006/main" showMasterSp="0">
   <p:cSld>
+    <p:bg>
+      <p:bgPr>
+        <a:solidFill>
+          <a:schemeClr val="bg1">
+            <a:alpha val="0"/>
+          </a:schemeClr>
+        </a:solidFill>
+        <a:effectLst/>
+      </p:bgPr>
+    </p:bg>
     <p:spTree>
       <p:nvGrpSpPr>
         <p:cNvPr id="1" name=""/>
@@ -3356,48 +3371,23 @@
         </p:nvSpPr>
         <p:spPr>
           <a:xfrm>
-            <a:off x="7834449" y="804995"/>
+            <a:off x="1125401" y="804995"/>
             <a:ext cx="2240884" cy="1022279"/>
           </a:xfrm>
           <a:prstGeom prst="rect">
             <a:avLst/>
           </a:prstGeom>
-          <a:gradFill flip="none" rotWithShape="1">
-            <a:gsLst>
-              <a:gs pos="0">
-                <a:schemeClr val="accent6">
-                  <a:lumMod val="67000"/>
-                </a:schemeClr>
-              </a:gs>
-              <a:gs pos="48000">
-                <a:schemeClr val="accent6">
-                  <a:lumMod val="97000"/>
-                  <a:lumOff val="3000"/>
-                </a:schemeClr>
-              </a:gs>
-              <a:gs pos="100000">
-                <a:schemeClr val="accent6">
-                  <a:lumMod val="60000"/>
-                  <a:lumOff val="40000"/>
-                </a:schemeClr>
-              </a:gs>
-            </a:gsLst>
-            <a:lin ang="16200000" scaled="1"/>
-            <a:tileRect/>
-          </a:gradFill>
-          <a:ln>
-            <a:noFill/>
-          </a:ln>
+          <a:ln/>
         </p:spPr>
         <p:style>
           <a:lnRef idx="0">
-            <a:scrgbClr r="0" g="0" b="0"/>
+            <a:schemeClr val="accent6"/>
           </a:lnRef>
-          <a:fillRef idx="0">
-            <a:scrgbClr r="0" g="0" b="0"/>
+          <a:fillRef idx="3">
+            <a:schemeClr val="accent6"/>
           </a:fillRef>
-          <a:effectRef idx="0">
-            <a:scrgbClr r="0" g="0" b="0"/>
+          <a:effectRef idx="3">
+            <a:schemeClr val="accent6"/>
           </a:effectRef>
           <a:fontRef idx="minor">
             <a:schemeClr val="lt1"/>
@@ -3436,48 +3426,23 @@
         </p:nvSpPr>
         <p:spPr>
           <a:xfrm>
-            <a:off x="8285989" y="2083437"/>
+            <a:off x="1576941" y="2083437"/>
             <a:ext cx="1340778" cy="339047"/>
           </a:xfrm>
           <a:prstGeom prst="rect">
             <a:avLst/>
           </a:prstGeom>
-          <a:gradFill flip="none" rotWithShape="1">
-            <a:gsLst>
-              <a:gs pos="0">
-                <a:schemeClr val="accent6">
-                  <a:lumMod val="67000"/>
-                </a:schemeClr>
-              </a:gs>
-              <a:gs pos="48000">
-                <a:schemeClr val="accent6">
-                  <a:lumMod val="97000"/>
-                  <a:lumOff val="3000"/>
-                </a:schemeClr>
-              </a:gs>
-              <a:gs pos="100000">
-                <a:schemeClr val="accent6">
-                  <a:lumMod val="60000"/>
-                  <a:lumOff val="40000"/>
-                </a:schemeClr>
-              </a:gs>
-            </a:gsLst>
-            <a:lin ang="16200000" scaled="1"/>
-            <a:tileRect/>
-          </a:gradFill>
-          <a:ln>
-            <a:noFill/>
-          </a:ln>
+          <a:ln/>
         </p:spPr>
         <p:style>
           <a:lnRef idx="0">
-            <a:scrgbClr r="0" g="0" b="0"/>
+            <a:schemeClr val="accent6"/>
           </a:lnRef>
-          <a:fillRef idx="0">
-            <a:scrgbClr r="0" g="0" b="0"/>
+          <a:fillRef idx="3">
+            <a:schemeClr val="accent6"/>
           </a:fillRef>
-          <a:effectRef idx="0">
-            <a:scrgbClr r="0" g="0" b="0"/>
+          <a:effectRef idx="3">
+            <a:schemeClr val="accent6"/>
           </a:effectRef>
           <a:fontRef idx="minor">
             <a:schemeClr val="lt1"/>
@@ -3509,48 +3474,23 @@
         </p:nvSpPr>
         <p:spPr>
           <a:xfrm>
-            <a:off x="7834449" y="2984643"/>
+            <a:off x="1125401" y="2984643"/>
             <a:ext cx="2564925" cy="1284270"/>
           </a:xfrm>
           <a:prstGeom prst="cube">
             <a:avLst/>
           </a:prstGeom>
-          <a:gradFill flip="none" rotWithShape="1">
-            <a:gsLst>
-              <a:gs pos="0">
-                <a:schemeClr val="accent6">
-                  <a:lumMod val="67000"/>
-                </a:schemeClr>
-              </a:gs>
-              <a:gs pos="48000">
-                <a:schemeClr val="accent6">
-                  <a:lumMod val="97000"/>
-                  <a:lumOff val="3000"/>
-                </a:schemeClr>
-              </a:gs>
-              <a:gs pos="100000">
-                <a:schemeClr val="accent6">
-                  <a:lumMod val="60000"/>
-                  <a:lumOff val="40000"/>
-                </a:schemeClr>
-              </a:gs>
-            </a:gsLst>
-            <a:lin ang="16200000" scaled="1"/>
-            <a:tileRect/>
-          </a:gradFill>
-          <a:ln>
-            <a:noFill/>
-          </a:ln>
+          <a:ln/>
         </p:spPr>
         <p:style>
           <a:lnRef idx="0">
-            <a:scrgbClr r="0" g="0" b="0"/>
+            <a:schemeClr val="accent6"/>
           </a:lnRef>
-          <a:fillRef idx="0">
-            <a:scrgbClr r="0" g="0" b="0"/>
+          <a:fillRef idx="3">
+            <a:schemeClr val="accent6"/>
           </a:fillRef>
-          <a:effectRef idx="0">
-            <a:scrgbClr r="0" g="0" b="0"/>
+          <a:effectRef idx="3">
+            <a:schemeClr val="accent6"/>
           </a:effectRef>
           <a:fontRef idx="minor">
             <a:schemeClr val="lt1"/>
@@ -3589,48 +3529,23 @@
         </p:nvSpPr>
         <p:spPr>
           <a:xfrm>
-            <a:off x="7563556" y="4824042"/>
+            <a:off x="854508" y="4824042"/>
             <a:ext cx="2782711" cy="883577"/>
           </a:xfrm>
           <a:prstGeom prst="can">
             <a:avLst/>
           </a:prstGeom>
-          <a:gradFill flip="none" rotWithShape="1">
-            <a:gsLst>
-              <a:gs pos="0">
-                <a:schemeClr val="accent6">
-                  <a:lumMod val="67000"/>
-                </a:schemeClr>
-              </a:gs>
-              <a:gs pos="48000">
-                <a:schemeClr val="accent6">
-                  <a:lumMod val="97000"/>
-                  <a:lumOff val="3000"/>
-                </a:schemeClr>
-              </a:gs>
-              <a:gs pos="100000">
-                <a:schemeClr val="accent6">
-                  <a:lumMod val="60000"/>
-                  <a:lumOff val="40000"/>
-                </a:schemeClr>
-              </a:gs>
-            </a:gsLst>
-            <a:lin ang="16200000" scaled="1"/>
-            <a:tileRect/>
-          </a:gradFill>
-          <a:ln>
-            <a:noFill/>
-          </a:ln>
+          <a:ln/>
         </p:spPr>
         <p:style>
           <a:lnRef idx="0">
-            <a:scrgbClr r="0" g="0" b="0"/>
+            <a:schemeClr val="accent6"/>
           </a:lnRef>
-          <a:fillRef idx="0">
-            <a:scrgbClr r="0" g="0" b="0"/>
+          <a:fillRef idx="3">
+            <a:schemeClr val="accent6"/>
           </a:fillRef>
-          <a:effectRef idx="0">
-            <a:scrgbClr r="0" g="0" b="0"/>
+          <a:effectRef idx="3">
+            <a:schemeClr val="accent6"/>
           </a:effectRef>
           <a:fontRef idx="minor">
             <a:schemeClr val="lt1"/>
@@ -3668,42 +3583,17 @@
           <a:prstGeom prst="rect">
             <a:avLst/>
           </a:prstGeom>
-          <a:gradFill flip="none" rotWithShape="1">
-            <a:gsLst>
-              <a:gs pos="0">
-                <a:schemeClr val="accent6">
-                  <a:lumMod val="67000"/>
-                </a:schemeClr>
-              </a:gs>
-              <a:gs pos="48000">
-                <a:schemeClr val="accent6">
-                  <a:lumMod val="97000"/>
-                  <a:lumOff val="3000"/>
-                </a:schemeClr>
-              </a:gs>
-              <a:gs pos="100000">
-                <a:schemeClr val="accent6">
-                  <a:lumMod val="60000"/>
-                  <a:lumOff val="40000"/>
-                </a:schemeClr>
-              </a:gs>
-            </a:gsLst>
-            <a:lin ang="16200000" scaled="1"/>
-            <a:tileRect/>
-          </a:gradFill>
-          <a:ln>
-            <a:noFill/>
-          </a:ln>
+          <a:ln/>
         </p:spPr>
         <p:style>
           <a:lnRef idx="0">
-            <a:scrgbClr r="0" g="0" b="0"/>
+            <a:schemeClr val="accent6"/>
           </a:lnRef>
-          <a:fillRef idx="0">
-            <a:scrgbClr r="0" g="0" b="0"/>
+          <a:fillRef idx="3">
+            <a:schemeClr val="accent6"/>
           </a:fillRef>
-          <a:effectRef idx="0">
-            <a:scrgbClr r="0" g="0" b="0"/>
+          <a:effectRef idx="3">
+            <a:schemeClr val="accent6"/>
           </a:effectRef>
           <a:fontRef idx="minor">
             <a:schemeClr val="lt1"/>
@@ -3749,42 +3639,17 @@
           <a:prstGeom prst="rect">
             <a:avLst/>
           </a:prstGeom>
-          <a:gradFill flip="none" rotWithShape="1">
-            <a:gsLst>
-              <a:gs pos="0">
-                <a:schemeClr val="accent6">
-                  <a:lumMod val="67000"/>
-                </a:schemeClr>
-              </a:gs>
-              <a:gs pos="48000">
-                <a:schemeClr val="accent6">
-                  <a:lumMod val="97000"/>
-                  <a:lumOff val="3000"/>
-                </a:schemeClr>
-              </a:gs>
-              <a:gs pos="100000">
-                <a:schemeClr val="accent6">
-                  <a:lumMod val="60000"/>
-                  <a:lumOff val="40000"/>
-                </a:schemeClr>
-              </a:gs>
-            </a:gsLst>
-            <a:lin ang="16200000" scaled="1"/>
-            <a:tileRect/>
-          </a:gradFill>
-          <a:ln>
-            <a:noFill/>
-          </a:ln>
+          <a:ln/>
         </p:spPr>
         <p:style>
           <a:lnRef idx="0">
-            <a:scrgbClr r="0" g="0" b="0"/>
+            <a:schemeClr val="accent6"/>
           </a:lnRef>
-          <a:fillRef idx="0">
-            <a:scrgbClr r="0" g="0" b="0"/>
+          <a:fillRef idx="3">
+            <a:schemeClr val="accent6"/>
           </a:fillRef>
-          <a:effectRef idx="0">
-            <a:scrgbClr r="0" g="0" b="0"/>
+          <a:effectRef idx="3">
+            <a:schemeClr val="accent6"/>
           </a:effectRef>
           <a:fontRef idx="minor">
             <a:schemeClr val="lt1"/>
@@ -3820,7 +3685,7 @@
         </p:nvCxnSpPr>
         <p:spPr>
           <a:xfrm>
-            <a:off x="8956378" y="2422484"/>
+            <a:off x="2247330" y="2422484"/>
             <a:ext cx="0" cy="883227"/>
           </a:xfrm>
           <a:prstGeom prst="straightConnector1">
@@ -3828,11 +3693,18 @@
           </a:prstGeom>
           <a:ln w="25400">
             <a:solidFill>
-              <a:schemeClr val="accent1"/>
+              <a:schemeClr val="tx1"/>
             </a:solidFill>
-            <a:headEnd w="lg" len="lg"/>
+            <a:headEnd type="none" w="lg" len="lg"/>
             <a:tailEnd type="triangle" w="lg" len="lg"/>
           </a:ln>
+          <a:effectLst>
+            <a:outerShdw blurRad="50800" dist="38100" algn="l" rotWithShape="0">
+              <a:prstClr val="black">
+                <a:alpha val="40000"/>
+              </a:prstClr>
+            </a:outerShdw>
+          </a:effectLst>
           <a:scene3d>
             <a:camera prst="orthographicFront"/>
             <a:lightRig rig="threePt" dir="t"/>
@@ -3881,7 +3753,7 @@
         </p:nvCxnSpPr>
         <p:spPr>
           <a:xfrm>
-            <a:off x="8954891" y="1827274"/>
+            <a:off x="2245843" y="1827274"/>
             <a:ext cx="1487" cy="256163"/>
           </a:xfrm>
           <a:prstGeom prst="straightConnector1">
@@ -3889,11 +3761,18 @@
           </a:prstGeom>
           <a:ln w="25400">
             <a:solidFill>
-              <a:schemeClr val="accent1"/>
+              <a:schemeClr val="tx1"/>
             </a:solidFill>
-            <a:headEnd w="lg" len="lg"/>
+            <a:headEnd type="none" w="lg" len="lg"/>
             <a:tailEnd type="triangle" w="lg" len="lg"/>
           </a:ln>
+          <a:effectLst>
+            <a:outerShdw blurRad="50800" dist="38100" algn="l" rotWithShape="0">
+              <a:prstClr val="black">
+                <a:alpha val="40000"/>
+              </a:prstClr>
+            </a:outerShdw>
+          </a:effectLst>
           <a:scene3d>
             <a:camera prst="orthographicFront"/>
             <a:lightRig rig="threePt" dir="t"/>
@@ -3935,26 +3814,145 @@
           </p:cNvPr>
           <p:cNvCxnSpPr>
             <a:cxnSpLocks/>
-            <a:stCxn id="10" idx="3"/>
-            <a:endCxn id="7" idx="2"/>
+            <a:stCxn id="10" idx="1"/>
+            <a:endCxn id="7" idx="4"/>
+          </p:cNvCxnSpPr>
+          <p:nvPr/>
+        </p:nvCxnSpPr>
+        <p:spPr>
+          <a:xfrm flipH="1" flipV="1">
+            <a:off x="3369259" y="3787312"/>
+            <a:ext cx="1365843" cy="1469203"/>
+          </a:xfrm>
+          <a:prstGeom prst="straightConnector1">
+            <a:avLst/>
+          </a:prstGeom>
+          <a:ln w="25400" cap="flat" cmpd="sng" algn="ctr">
+            <a:solidFill>
+              <a:schemeClr val="tx1"/>
+            </a:solidFill>
+            <a:prstDash val="solid"/>
+            <a:round/>
+            <a:headEnd type="triangle" w="lg" len="lg"/>
+            <a:tailEnd type="triangle" w="lg" len="lg"/>
+          </a:ln>
+          <a:effectLst>
+            <a:outerShdw blurRad="50800" dist="38100" algn="l" rotWithShape="0">
+              <a:prstClr val="black">
+                <a:alpha val="40000"/>
+              </a:prstClr>
+            </a:outerShdw>
+          </a:effectLst>
+        </p:spPr>
+        <p:style>
+          <a:lnRef idx="0">
+            <a:scrgbClr r="0" g="0" b="0"/>
+          </a:lnRef>
+          <a:fillRef idx="0">
+            <a:scrgbClr r="0" g="0" b="0"/>
+          </a:fillRef>
+          <a:effectRef idx="0">
+            <a:scrgbClr r="0" g="0" b="0"/>
+          </a:effectRef>
+          <a:fontRef idx="minor">
+            <a:schemeClr val="tx1"/>
+          </a:fontRef>
+        </p:style>
+      </p:cxnSp>
+      <p:cxnSp>
+        <p:nvCxnSpPr>
+          <p:cNvPr id="43" name="Straight Arrow Connector 42">
+            <a:extLst>
+              <a:ext uri="{FF2B5EF4-FFF2-40B4-BE49-F238E27FC236}">
+                <a16:creationId xmlns:a16="http://schemas.microsoft.com/office/drawing/2014/main" id="{7A580665-A8DD-40A7-B92C-EA3BA7EF202E}"/>
+              </a:ext>
+            </a:extLst>
+          </p:cNvPr>
+          <p:cNvCxnSpPr>
+            <a:cxnSpLocks/>
+            <a:stCxn id="7" idx="4"/>
+            <a:endCxn id="9" idx="1"/>
           </p:cNvCxnSpPr>
           <p:nvPr/>
         </p:nvCxnSpPr>
         <p:spPr>
           <a:xfrm flipV="1">
-            <a:off x="6310487" y="3787312"/>
-            <a:ext cx="1523962" cy="1469203"/>
+            <a:off x="3369259" y="1615369"/>
+            <a:ext cx="1365843" cy="2171943"/>
+          </a:xfrm>
+          <a:prstGeom prst="straightConnector1">
+            <a:avLst/>
+          </a:prstGeom>
+          <a:ln w="25400" cap="flat" cmpd="sng" algn="ctr">
+            <a:solidFill>
+              <a:schemeClr val="tx1"/>
+            </a:solidFill>
+            <a:prstDash val="solid"/>
+            <a:round/>
+            <a:headEnd type="triangle" w="lg" len="lg"/>
+            <a:tailEnd type="triangle" w="lg" len="lg"/>
+          </a:ln>
+          <a:effectLst>
+            <a:outerShdw blurRad="50800" dist="38100" algn="l" rotWithShape="0">
+              <a:prstClr val="black">
+                <a:alpha val="40000"/>
+              </a:prstClr>
+            </a:outerShdw>
+          </a:effectLst>
+        </p:spPr>
+        <p:style>
+          <a:lnRef idx="0">
+            <a:scrgbClr r="0" g="0" b="0"/>
+          </a:lnRef>
+          <a:fillRef idx="0">
+            <a:scrgbClr r="0" g="0" b="0"/>
+          </a:fillRef>
+          <a:effectRef idx="0">
+            <a:scrgbClr r="0" g="0" b="0"/>
+          </a:effectRef>
+          <a:fontRef idx="minor">
+            <a:schemeClr val="tx1"/>
+          </a:fontRef>
+        </p:style>
+      </p:cxnSp>
+      <p:cxnSp>
+        <p:nvCxnSpPr>
+          <p:cNvPr id="44" name="Straight Arrow Connector 43">
+            <a:extLst>
+              <a:ext uri="{FF2B5EF4-FFF2-40B4-BE49-F238E27FC236}">
+                <a16:creationId xmlns:a16="http://schemas.microsoft.com/office/drawing/2014/main" id="{3E596024-04E1-4FCE-8AA7-46A7C116BC8F}"/>
+              </a:ext>
+            </a:extLst>
+          </p:cNvPr>
+          <p:cNvCxnSpPr>
+            <a:cxnSpLocks/>
+            <a:stCxn id="7" idx="3"/>
+            <a:endCxn id="8" idx="0"/>
+          </p:cNvCxnSpPr>
+          <p:nvPr/>
+        </p:nvCxnSpPr>
+        <p:spPr>
+          <a:xfrm flipH="1">
+            <a:off x="2245864" y="4268913"/>
+            <a:ext cx="1466" cy="776023"/>
           </a:xfrm>
           <a:prstGeom prst="straightConnector1">
             <a:avLst/>
           </a:prstGeom>
           <a:ln w="25400">
             <a:solidFill>
-              <a:schemeClr val="accent1"/>
+              <a:schemeClr val="tx1"/>
             </a:solidFill>
             <a:headEnd type="triangle" w="lg" len="lg"/>
             <a:tailEnd type="triangle" w="lg" len="lg"/>
           </a:ln>
+          <a:effectLst>
+            <a:outerShdw blurRad="50800" dist="38100" algn="l" rotWithShape="0">
+              <a:prstClr val="black">
+                <a:alpha val="40000"/>
+              </a:prstClr>
+            </a:outerShdw>
+          </a:effectLst>
           <a:scene3d>
             <a:camera prst="orthographicFront"/>
             <a:lightRig rig="threePt" dir="t"/>
@@ -3985,128 +3983,6 @@
           </a:fontRef>
         </p:style>
       </p:cxnSp>
-      <p:cxnSp>
-        <p:nvCxnSpPr>
-          <p:cNvPr id="43" name="Straight Arrow Connector 42">
-            <a:extLst>
-              <a:ext uri="{FF2B5EF4-FFF2-40B4-BE49-F238E27FC236}">
-                <a16:creationId xmlns:a16="http://schemas.microsoft.com/office/drawing/2014/main" id="{7A580665-A8DD-40A7-B92C-EA3BA7EF202E}"/>
-              </a:ext>
-            </a:extLst>
-          </p:cNvPr>
-          <p:cNvCxnSpPr>
-            <a:cxnSpLocks/>
-            <a:stCxn id="7" idx="2"/>
-            <a:endCxn id="9" idx="3"/>
-          </p:cNvCxnSpPr>
-          <p:nvPr/>
-        </p:nvCxnSpPr>
-        <p:spPr>
-          <a:xfrm flipH="1" flipV="1">
-            <a:off x="6442736" y="1615369"/>
-            <a:ext cx="1391713" cy="2171943"/>
-          </a:xfrm>
-          <a:prstGeom prst="straightConnector1">
-            <a:avLst/>
-          </a:prstGeom>
-          <a:ln w="25400">
-            <a:solidFill>
-              <a:schemeClr val="accent1"/>
-            </a:solidFill>
-            <a:headEnd type="triangle" w="lg" len="lg"/>
-            <a:tailEnd type="triangle" w="lg" len="lg"/>
-          </a:ln>
-          <a:scene3d>
-            <a:camera prst="orthographicFront"/>
-            <a:lightRig rig="threePt" dir="t"/>
-          </a:scene3d>
-          <a:sp3d>
-            <a:bevelT w="0"/>
-            <a:bevelB w="0"/>
-          </a:sp3d>
-        </p:spPr>
-        <p:style>
-          <a:lnRef idx="1">
-            <a:schemeClr val="accent1">
-              <a:lumMod val="67000"/>
-            </a:schemeClr>
-          </a:lnRef>
-          <a:fillRef idx="0">
-            <a:schemeClr val="accent1">
-              <a:lumMod val="67000"/>
-            </a:schemeClr>
-          </a:fillRef>
-          <a:effectRef idx="0">
-            <a:schemeClr val="accent1">
-              <a:lumMod val="67000"/>
-            </a:schemeClr>
-          </a:effectRef>
-          <a:fontRef idx="minor">
-            <a:schemeClr val="tx1"/>
-          </a:fontRef>
-        </p:style>
-      </p:cxnSp>
-      <p:cxnSp>
-        <p:nvCxnSpPr>
-          <p:cNvPr id="44" name="Straight Arrow Connector 43">
-            <a:extLst>
-              <a:ext uri="{FF2B5EF4-FFF2-40B4-BE49-F238E27FC236}">
-                <a16:creationId xmlns:a16="http://schemas.microsoft.com/office/drawing/2014/main" id="{3E596024-04E1-4FCE-8AA7-46A7C116BC8F}"/>
-              </a:ext>
-            </a:extLst>
-          </p:cNvPr>
-          <p:cNvCxnSpPr>
-            <a:cxnSpLocks/>
-            <a:stCxn id="7" idx="3"/>
-            <a:endCxn id="8" idx="0"/>
-          </p:cNvCxnSpPr>
-          <p:nvPr/>
-        </p:nvCxnSpPr>
-        <p:spPr>
-          <a:xfrm flipH="1">
-            <a:off x="8954912" y="4268913"/>
-            <a:ext cx="1466" cy="776023"/>
-          </a:xfrm>
-          <a:prstGeom prst="straightConnector1">
-            <a:avLst/>
-          </a:prstGeom>
-          <a:ln w="25400">
-            <a:solidFill>
-              <a:schemeClr val="accent1"/>
-            </a:solidFill>
-            <a:headEnd w="lg" len="lg"/>
-            <a:tailEnd type="triangle" w="lg" len="lg"/>
-          </a:ln>
-          <a:scene3d>
-            <a:camera prst="orthographicFront"/>
-            <a:lightRig rig="threePt" dir="t"/>
-          </a:scene3d>
-          <a:sp3d>
-            <a:bevelT w="0"/>
-            <a:bevelB w="0"/>
-          </a:sp3d>
-        </p:spPr>
-        <p:style>
-          <a:lnRef idx="1">
-            <a:schemeClr val="accent1">
-              <a:lumMod val="67000"/>
-            </a:schemeClr>
-          </a:lnRef>
-          <a:fillRef idx="0">
-            <a:schemeClr val="accent1">
-              <a:lumMod val="67000"/>
-            </a:schemeClr>
-          </a:fillRef>
-          <a:effectRef idx="0">
-            <a:schemeClr val="accent1">
-              <a:lumMod val="67000"/>
-            </a:schemeClr>
-          </a:effectRef>
-          <a:fontRef idx="minor">
-            <a:schemeClr val="tx1"/>
-          </a:fontRef>
-        </p:style>
-      </p:cxnSp>
       <p:sp>
         <p:nvSpPr>
           <p:cNvPr id="97" name="TextBox 96">
@@ -4121,7 +3997,7 @@
         </p:nvSpPr>
         <p:spPr>
           <a:xfrm>
-            <a:off x="6842994" y="2068294"/>
+            <a:off x="4073501" y="2579310"/>
             <a:ext cx="835376" cy="369332"/>
           </a:xfrm>
           <a:prstGeom prst="rect">
@@ -4136,11 +4012,7 @@
           <a:lstStyle/>
           <a:p>
             <a:r>
-              <a:rPr lang="en-ZA" dirty="0">
-                <a:solidFill>
-                  <a:schemeClr val="accent1"/>
-                </a:solidFill>
-              </a:rPr>
+              <a:rPr lang="en-ZA" dirty="0"/>
               <a:t>HTTP</a:t>
             </a:r>
           </a:p>
@@ -4160,7 +4032,7 @@
         </p:nvSpPr>
         <p:spPr>
           <a:xfrm>
-            <a:off x="6391453" y="4128714"/>
+            <a:off x="4052180" y="4049772"/>
             <a:ext cx="835376" cy="646331"/>
           </a:xfrm>
           <a:prstGeom prst="rect">
@@ -4175,11 +4047,7 @@
           <a:lstStyle/>
           <a:p>
             <a:r>
-              <a:rPr lang="en-ZA" dirty="0">
-                <a:solidFill>
-                  <a:schemeClr val="accent1"/>
-                </a:solidFill>
-              </a:rPr>
+              <a:rPr lang="en-ZA" dirty="0"/>
               <a:t>HTTP/ Rest</a:t>
             </a:r>
           </a:p>
@@ -4199,7 +4067,7 @@
         </p:nvSpPr>
         <p:spPr>
           <a:xfrm>
-            <a:off x="8954891" y="2516674"/>
+            <a:off x="2245843" y="2516674"/>
             <a:ext cx="1238635" cy="369332"/>
           </a:xfrm>
           <a:prstGeom prst="rect">
@@ -4214,11 +4082,7 @@
           <a:lstStyle/>
           <a:p>
             <a:r>
-              <a:rPr lang="en-ZA" dirty="0">
-                <a:solidFill>
-                  <a:schemeClr val="accent1"/>
-                </a:solidFill>
-              </a:rPr>
+              <a:rPr lang="en-ZA" dirty="0"/>
               <a:t>TSD RPC</a:t>
             </a:r>
           </a:p>

</xml_diff>